<commit_message>
correct date on Zmodn.pptx
</commit_message>
<xml_diff>
--- a/spring15/slidesS15/Zmodn.pptx
+++ b/spring15/slidesS15/Zmodn.pptx
@@ -4744,7 +4744,22 @@
                 <a:uFillTx/>
                 <a:latin typeface="Comic Sans MS" pitchFamily="66" charset="0"/>
               </a:rPr>
-              <a:t>13, 2015</a:t>
+              <a:t>11, </a:t>
+            </a:r>
+            <a:r>
+              <a:rPr kumimoji="0" lang="en-US" sz="1200" b="0" i="0" u="none" strike="noStrike" kern="1200" cap="none" spc="0" normalizeH="0" baseline="0" noProof="0" dirty="0" smtClean="0">
+                <a:ln>
+                  <a:noFill/>
+                </a:ln>
+                <a:solidFill>
+                  <a:schemeClr val="tx1"/>
+                </a:solidFill>
+                <a:effectLst/>
+                <a:uLnTx/>
+                <a:uFillTx/>
+                <a:latin typeface="Comic Sans MS" pitchFamily="66" charset="0"/>
+              </a:rPr>
+              <a:t>2015</a:t>
             </a:r>
             <a:endParaRPr kumimoji="0" lang="en-US" sz="1200" b="0" i="0" u="none" strike="noStrike" kern="1200" cap="none" spc="0" normalizeH="0" baseline="0" noProof="0" dirty="0">
               <a:ln>
@@ -5376,7 +5391,7 @@
           <a:graphicData uri="http://schemas.openxmlformats.org/presentationml/2006/ole">
             <mc:AlternateContent xmlns:mc="http://schemas.openxmlformats.org/markup-compatibility/2006">
               <mc:Choice xmlns:v="urn:schemas-microsoft-com:vml" Requires="v">
-                <p:oleObj spid="_x0000_s5139" name="Equation" r:id="rId4" imgW="203200" imgH="292100" progId="Equation.DSMT4">
+                <p:oleObj spid="_x0000_s5141" name="Equation" r:id="rId4" imgW="203200" imgH="292100" progId="Equation.DSMT4">
                   <p:embed/>
                 </p:oleObj>
               </mc:Choice>
@@ -5703,7 +5718,7 @@
           <a:graphicData uri="http://schemas.openxmlformats.org/presentationml/2006/ole">
             <mc:AlternateContent xmlns:mc="http://schemas.openxmlformats.org/markup-compatibility/2006">
               <mc:Choice xmlns:v="urn:schemas-microsoft-com:vml" Requires="v">
-                <p:oleObj spid="_x0000_s14399" name="Equation" r:id="rId4" imgW="203200" imgH="292100" progId="Equation.DSMT4">
+                <p:oleObj spid="_x0000_s14404" name="Equation" r:id="rId4" imgW="203200" imgH="292100" progId="Equation.DSMT4">
                   <p:embed/>
                 </p:oleObj>
               </mc:Choice>
@@ -5760,7 +5775,7 @@
           <a:graphicData uri="http://schemas.openxmlformats.org/presentationml/2006/ole">
             <mc:AlternateContent xmlns:mc="http://schemas.openxmlformats.org/markup-compatibility/2006">
               <mc:Choice xmlns:v="urn:schemas-microsoft-com:vml" Requires="v">
-                <p:oleObj spid="_x0000_s14400" name="Equation" r:id="rId6" imgW="139700" imgH="215900" progId="Equation.DSMT4">
+                <p:oleObj spid="_x0000_s14405" name="Equation" r:id="rId6" imgW="139700" imgH="215900" progId="Equation.DSMT4">
                   <p:embed/>
                 </p:oleObj>
               </mc:Choice>
@@ -5817,7 +5832,7 @@
           <a:graphicData uri="http://schemas.openxmlformats.org/presentationml/2006/ole">
             <mc:AlternateContent xmlns:mc="http://schemas.openxmlformats.org/markup-compatibility/2006">
               <mc:Choice xmlns:v="urn:schemas-microsoft-com:vml" Requires="v">
-                <p:oleObj spid="_x0000_s14401" name="Equation" r:id="rId8" imgW="1257300" imgH="292100" progId="Equation.DSMT4">
+                <p:oleObj spid="_x0000_s14406" name="Equation" r:id="rId8" imgW="1257300" imgH="292100" progId="Equation.DSMT4">
                   <p:embed/>
                 </p:oleObj>
               </mc:Choice>
@@ -5908,7 +5923,7 @@
           <a:graphicData uri="http://schemas.openxmlformats.org/presentationml/2006/ole">
             <mc:AlternateContent xmlns:mc="http://schemas.openxmlformats.org/markup-compatibility/2006">
               <mc:Choice xmlns:v="urn:schemas-microsoft-com:vml" Requires="v">
-                <p:oleObj spid="_x0000_s14402" name="Equation" r:id="rId10" imgW="1308100" imgH="292100" progId="Equation.DSMT4">
+                <p:oleObj spid="_x0000_s14407" name="Equation" r:id="rId10" imgW="1308100" imgH="292100" progId="Equation.DSMT4">
                   <p:embed/>
                 </p:oleObj>
               </mc:Choice>
@@ -6172,7 +6187,7 @@
           <a:graphicData uri="http://schemas.openxmlformats.org/presentationml/2006/ole">
             <mc:AlternateContent xmlns:mc="http://schemas.openxmlformats.org/markup-compatibility/2006">
               <mc:Choice xmlns:v="urn:schemas-microsoft-com:vml" Requires="v">
-                <p:oleObj spid="_x0000_s15404" name="Equation" r:id="rId4" imgW="139700" imgH="215900" progId="Equation.DSMT4">
+                <p:oleObj spid="_x0000_s15408" name="Equation" r:id="rId4" imgW="139700" imgH="215900" progId="Equation.DSMT4">
                   <p:embed/>
                 </p:oleObj>
               </mc:Choice>
@@ -6229,7 +6244,7 @@
           <a:graphicData uri="http://schemas.openxmlformats.org/presentationml/2006/ole">
             <mc:AlternateContent xmlns:mc="http://schemas.openxmlformats.org/markup-compatibility/2006">
               <mc:Choice xmlns:v="urn:schemas-microsoft-com:vml" Requires="v">
-                <p:oleObj spid="_x0000_s15405" name="Equation" r:id="rId6" imgW="1955800" imgH="533400" progId="Equation.DSMT4">
+                <p:oleObj spid="_x0000_s15409" name="Equation" r:id="rId6" imgW="1955800" imgH="533400" progId="Equation.DSMT4">
                   <p:embed/>
                 </p:oleObj>
               </mc:Choice>
@@ -6286,7 +6301,7 @@
           <a:graphicData uri="http://schemas.openxmlformats.org/presentationml/2006/ole">
             <mc:AlternateContent xmlns:mc="http://schemas.openxmlformats.org/markup-compatibility/2006">
               <mc:Choice xmlns:v="urn:schemas-microsoft-com:vml" Requires="v">
-                <p:oleObj spid="_x0000_s15406" name="Equation" r:id="rId8" imgW="1930400" imgH="812800" progId="Equation.DSMT4">
+                <p:oleObj spid="_x0000_s15410" name="Equation" r:id="rId8" imgW="1930400" imgH="812800" progId="Equation.DSMT4">
                   <p:embed/>
                 </p:oleObj>
               </mc:Choice>
@@ -6506,7 +6521,7 @@
           <a:graphicData uri="http://schemas.openxmlformats.org/presentationml/2006/ole">
             <mc:AlternateContent xmlns:mc="http://schemas.openxmlformats.org/markup-compatibility/2006">
               <mc:Choice xmlns:v="urn:schemas-microsoft-com:vml" Requires="v">
-                <p:oleObj spid="_x0000_s17447" name="Equation" r:id="rId4" imgW="139700" imgH="215900" progId="Equation.DSMT4">
+                <p:oleObj spid="_x0000_s17451" name="Equation" r:id="rId4" imgW="139700" imgH="215900" progId="Equation.DSMT4">
                   <p:embed/>
                 </p:oleObj>
               </mc:Choice>
@@ -6563,7 +6578,7 @@
           <a:graphicData uri="http://schemas.openxmlformats.org/presentationml/2006/ole">
             <mc:AlternateContent xmlns:mc="http://schemas.openxmlformats.org/markup-compatibility/2006">
               <mc:Choice xmlns:v="urn:schemas-microsoft-com:vml" Requires="v">
-                <p:oleObj spid="_x0000_s17448" name="Equation" r:id="rId6" imgW="1955800" imgH="533400" progId="Equation.DSMT4">
+                <p:oleObj spid="_x0000_s17452" name="Equation" r:id="rId6" imgW="1955800" imgH="533400" progId="Equation.DSMT4">
                   <p:embed/>
                 </p:oleObj>
               </mc:Choice>
@@ -6620,7 +6635,7 @@
           <a:graphicData uri="http://schemas.openxmlformats.org/presentationml/2006/ole">
             <mc:AlternateContent xmlns:mc="http://schemas.openxmlformats.org/markup-compatibility/2006">
               <mc:Choice xmlns:v="urn:schemas-microsoft-com:vml" Requires="v">
-                <p:oleObj spid="_x0000_s17449" name="Equation" r:id="rId8" imgW="812800" imgH="355600" progId="Equation.DSMT4">
+                <p:oleObj spid="_x0000_s17453" name="Equation" r:id="rId8" imgW="812800" imgH="355600" progId="Equation.DSMT4">
                   <p:embed/>
                 </p:oleObj>
               </mc:Choice>
@@ -6787,7 +6802,7 @@
           <a:graphicData uri="http://schemas.openxmlformats.org/presentationml/2006/ole">
             <mc:AlternateContent xmlns:mc="http://schemas.openxmlformats.org/markup-compatibility/2006">
               <mc:Choice xmlns:v="urn:schemas-microsoft-com:vml" Requires="v">
-                <p:oleObj spid="_x0000_s16428" name="Equation" r:id="rId4" imgW="114300" imgH="165100" progId="Equation.3">
+                <p:oleObj spid="_x0000_s16432" name="Equation" r:id="rId4" imgW="114300" imgH="165100" progId="Equation.3">
                   <p:embed/>
                 </p:oleObj>
               </mc:Choice>
@@ -6844,7 +6859,7 @@
           <a:graphicData uri="http://schemas.openxmlformats.org/presentationml/2006/ole">
             <mc:AlternateContent xmlns:mc="http://schemas.openxmlformats.org/markup-compatibility/2006">
               <mc:Choice xmlns:v="urn:schemas-microsoft-com:vml" Requires="v">
-                <p:oleObj spid="_x0000_s16429" name="Equation" r:id="rId6" imgW="939800" imgH="292100" progId="Equation.DSMT4">
+                <p:oleObj spid="_x0000_s16433" name="Equation" r:id="rId6" imgW="939800" imgH="292100" progId="Equation.DSMT4">
                   <p:embed/>
                 </p:oleObj>
               </mc:Choice>
@@ -6901,7 +6916,7 @@
           <a:graphicData uri="http://schemas.openxmlformats.org/presentationml/2006/ole">
             <mc:AlternateContent xmlns:mc="http://schemas.openxmlformats.org/markup-compatibility/2006">
               <mc:Choice xmlns:v="urn:schemas-microsoft-com:vml" Requires="v">
-                <p:oleObj spid="_x0000_s16430" name="Equation" r:id="rId8" imgW="736600" imgH="292100" progId="Equation.DSMT4">
+                <p:oleObj spid="_x0000_s16434" name="Equation" r:id="rId8" imgW="736600" imgH="292100" progId="Equation.DSMT4">
                   <p:embed/>
                 </p:oleObj>
               </mc:Choice>
@@ -7144,7 +7159,7 @@
           <a:graphicData uri="http://schemas.openxmlformats.org/presentationml/2006/ole">
             <mc:AlternateContent xmlns:mc="http://schemas.openxmlformats.org/markup-compatibility/2006">
               <mc:Choice xmlns:v="urn:schemas-microsoft-com:vml" Requires="v">
-                <p:oleObj spid="_x0000_s18492" name="Equation" r:id="rId4" imgW="114300" imgH="165100" progId="Equation.3">
+                <p:oleObj spid="_x0000_s18496" name="Equation" r:id="rId4" imgW="114300" imgH="165100" progId="Equation.3">
                   <p:embed/>
                 </p:oleObj>
               </mc:Choice>
@@ -7201,7 +7216,7 @@
           <a:graphicData uri="http://schemas.openxmlformats.org/presentationml/2006/ole">
             <mc:AlternateContent xmlns:mc="http://schemas.openxmlformats.org/markup-compatibility/2006">
               <mc:Choice xmlns:v="urn:schemas-microsoft-com:vml" Requires="v">
-                <p:oleObj spid="_x0000_s18493" name="Equation" r:id="rId6" imgW="1308100" imgH="292100" progId="Equation.DSMT4">
+                <p:oleObj spid="_x0000_s18497" name="Equation" r:id="rId6" imgW="1308100" imgH="292100" progId="Equation.DSMT4">
                   <p:embed/>
                 </p:oleObj>
               </mc:Choice>
@@ -7258,7 +7273,7 @@
           <a:graphicData uri="http://schemas.openxmlformats.org/presentationml/2006/ole">
             <mc:AlternateContent xmlns:mc="http://schemas.openxmlformats.org/markup-compatibility/2006">
               <mc:Choice xmlns:v="urn:schemas-microsoft-com:vml" Requires="v">
-                <p:oleObj spid="_x0000_s18494" name="Equation" r:id="rId8" imgW="596900" imgH="330200" progId="Equation.DSMT4">
+                <p:oleObj spid="_x0000_s18498" name="Equation" r:id="rId8" imgW="596900" imgH="330200" progId="Equation.DSMT4">
                   <p:embed/>
                 </p:oleObj>
               </mc:Choice>
@@ -7548,7 +7563,7 @@
           <a:graphicData uri="http://schemas.openxmlformats.org/presentationml/2006/ole">
             <mc:AlternateContent xmlns:mc="http://schemas.openxmlformats.org/markup-compatibility/2006">
               <mc:Choice xmlns:v="urn:schemas-microsoft-com:vml" Requires="v">
-                <p:oleObj spid="_x0000_s19498" name="Equation" r:id="rId4" imgW="114300" imgH="165100" progId="Equation.3">
+                <p:oleObj spid="_x0000_s19502" name="Equation" r:id="rId4" imgW="114300" imgH="165100" progId="Equation.3">
                   <p:embed/>
                 </p:oleObj>
               </mc:Choice>
@@ -7605,7 +7620,7 @@
           <a:graphicData uri="http://schemas.openxmlformats.org/presentationml/2006/ole">
             <mc:AlternateContent xmlns:mc="http://schemas.openxmlformats.org/markup-compatibility/2006">
               <mc:Choice xmlns:v="urn:schemas-microsoft-com:vml" Requires="v">
-                <p:oleObj spid="_x0000_s19499" name="Equation" r:id="rId6" imgW="596900" imgH="330200" progId="Equation.DSMT4">
+                <p:oleObj spid="_x0000_s19503" name="Equation" r:id="rId6" imgW="596900" imgH="330200" progId="Equation.DSMT4">
                   <p:embed/>
                 </p:oleObj>
               </mc:Choice>
@@ -7662,7 +7677,7 @@
           <a:graphicData uri="http://schemas.openxmlformats.org/presentationml/2006/ole">
             <mc:AlternateContent xmlns:mc="http://schemas.openxmlformats.org/markup-compatibility/2006">
               <mc:Choice xmlns:v="urn:schemas-microsoft-com:vml" Requires="v">
-                <p:oleObj spid="_x0000_s19500" name="Equation" r:id="rId8" imgW="1689100" imgH="673100" progId="Equation.DSMT4">
+                <p:oleObj spid="_x0000_s19504" name="Equation" r:id="rId8" imgW="1689100" imgH="673100" progId="Equation.DSMT4">
                   <p:embed/>
                 </p:oleObj>
               </mc:Choice>
@@ -7829,7 +7844,7 @@
           <a:graphicData uri="http://schemas.openxmlformats.org/presentationml/2006/ole">
             <mc:AlternateContent xmlns:mc="http://schemas.openxmlformats.org/markup-compatibility/2006">
               <mc:Choice xmlns:v="urn:schemas-microsoft-com:vml" Requires="v">
-                <p:oleObj spid="_x0000_s20526" name="Equation" r:id="rId4" imgW="114300" imgH="165100" progId="Equation.3">
+                <p:oleObj spid="_x0000_s20530" name="Equation" r:id="rId4" imgW="114300" imgH="165100" progId="Equation.3">
                   <p:embed/>
                 </p:oleObj>
               </mc:Choice>
@@ -7886,7 +7901,7 @@
           <a:graphicData uri="http://schemas.openxmlformats.org/presentationml/2006/ole">
             <mc:AlternateContent xmlns:mc="http://schemas.openxmlformats.org/markup-compatibility/2006">
               <mc:Choice xmlns:v="urn:schemas-microsoft-com:vml" Requires="v">
-                <p:oleObj spid="_x0000_s20527" name="Equation" r:id="rId6" imgW="1485900" imgH="292100" progId="Equation.DSMT4">
+                <p:oleObj spid="_x0000_s20531" name="Equation" r:id="rId6" imgW="1485900" imgH="292100" progId="Equation.DSMT4">
                   <p:embed/>
                 </p:oleObj>
               </mc:Choice>
@@ -7943,7 +7958,7 @@
           <a:graphicData uri="http://schemas.openxmlformats.org/presentationml/2006/ole">
             <mc:AlternateContent xmlns:mc="http://schemas.openxmlformats.org/markup-compatibility/2006">
               <mc:Choice xmlns:v="urn:schemas-microsoft-com:vml" Requires="v">
-                <p:oleObj spid="_x0000_s20528" name="Equation" r:id="rId8" imgW="812800" imgH="292100" progId="Equation.DSMT4">
+                <p:oleObj spid="_x0000_s20532" name="Equation" r:id="rId8" imgW="812800" imgH="292100" progId="Equation.DSMT4">
                   <p:embed/>
                 </p:oleObj>
               </mc:Choice>
@@ -8186,7 +8201,7 @@
           <a:graphicData uri="http://schemas.openxmlformats.org/presentationml/2006/ole">
             <mc:AlternateContent xmlns:mc="http://schemas.openxmlformats.org/markup-compatibility/2006">
               <mc:Choice xmlns:v="urn:schemas-microsoft-com:vml" Requires="v">
-                <p:oleObj spid="_x0000_s21552" name="Equation" r:id="rId4" imgW="114300" imgH="165100" progId="Equation.3">
+                <p:oleObj spid="_x0000_s21556" name="Equation" r:id="rId4" imgW="114300" imgH="165100" progId="Equation.3">
                   <p:embed/>
                 </p:oleObj>
               </mc:Choice>
@@ -8243,7 +8258,7 @@
           <a:graphicData uri="http://schemas.openxmlformats.org/presentationml/2006/ole">
             <mc:AlternateContent xmlns:mc="http://schemas.openxmlformats.org/markup-compatibility/2006">
               <mc:Choice xmlns:v="urn:schemas-microsoft-com:vml" Requires="v">
-                <p:oleObj spid="_x0000_s21553" name="Equation" r:id="rId6" imgW="762000" imgH="292100" progId="Equation.DSMT4">
+                <p:oleObj spid="_x0000_s21557" name="Equation" r:id="rId6" imgW="762000" imgH="292100" progId="Equation.DSMT4">
                   <p:embed/>
                 </p:oleObj>
               </mc:Choice>
@@ -8300,7 +8315,7 @@
           <a:graphicData uri="http://schemas.openxmlformats.org/presentationml/2006/ole">
             <mc:AlternateContent xmlns:mc="http://schemas.openxmlformats.org/markup-compatibility/2006">
               <mc:Choice xmlns:v="urn:schemas-microsoft-com:vml" Requires="v">
-                <p:oleObj spid="_x0000_s21554" name="Equation" r:id="rId8" imgW="635000" imgH="292100" progId="Equation.DSMT4">
+                <p:oleObj spid="_x0000_s21558" name="Equation" r:id="rId8" imgW="635000" imgH="292100" progId="Equation.DSMT4">
                   <p:embed/>
                 </p:oleObj>
               </mc:Choice>
@@ -8841,7 +8856,7 @@
           <a:graphicData uri="http://schemas.openxmlformats.org/presentationml/2006/ole">
             <mc:AlternateContent xmlns:mc="http://schemas.openxmlformats.org/markup-compatibility/2006">
               <mc:Choice xmlns:v="urn:schemas-microsoft-com:vml" Requires="v">
-                <p:oleObj spid="_x0000_s28699" name="Equation" r:id="rId4" imgW="368300" imgH="292100" progId="Equation.DSMT4">
+                <p:oleObj spid="_x0000_s28702" name="Equation" r:id="rId4" imgW="368300" imgH="292100" progId="Equation.DSMT4">
                   <p:embed/>
                 </p:oleObj>
               </mc:Choice>
@@ -8965,7 +8980,7 @@
             <a:graphicData uri="http://schemas.openxmlformats.org/presentationml/2006/ole">
               <mc:AlternateContent xmlns:mc="http://schemas.openxmlformats.org/markup-compatibility/2006">
                 <mc:Choice xmlns:v="urn:schemas-microsoft-com:vml" Requires="v">
-                  <p:oleObj spid="_x0000_s28700" name="Equation" r:id="rId6" imgW="203200" imgH="292100" progId="Equation.DSMT4">
+                  <p:oleObj spid="_x0000_s28703" name="Equation" r:id="rId6" imgW="203200" imgH="292100" progId="Equation.DSMT4">
                     <p:embed/>
                   </p:oleObj>
                 </mc:Choice>
@@ -9860,7 +9875,7 @@
           <a:graphicData uri="http://schemas.openxmlformats.org/presentationml/2006/ole">
             <mc:AlternateContent xmlns:mc="http://schemas.openxmlformats.org/markup-compatibility/2006">
               <mc:Choice xmlns:v="urn:schemas-microsoft-com:vml" Requires="v">
-                <p:oleObj spid="_x0000_s29723" name="Equation" r:id="rId4" imgW="368300" imgH="292100" progId="Equation.DSMT4">
+                <p:oleObj spid="_x0000_s29726" name="Equation" r:id="rId4" imgW="368300" imgH="292100" progId="Equation.DSMT4">
                   <p:embed/>
                 </p:oleObj>
               </mc:Choice>
@@ -9984,7 +9999,7 @@
             <a:graphicData uri="http://schemas.openxmlformats.org/presentationml/2006/ole">
               <mc:AlternateContent xmlns:mc="http://schemas.openxmlformats.org/markup-compatibility/2006">
                 <mc:Choice xmlns:v="urn:schemas-microsoft-com:vml" Requires="v">
-                  <p:oleObj spid="_x0000_s29724" name="Equation" r:id="rId6" imgW="203200" imgH="292100" progId="Equation.DSMT4">
+                  <p:oleObj spid="_x0000_s29727" name="Equation" r:id="rId6" imgW="203200" imgH="292100" progId="Equation.DSMT4">
                     <p:embed/>
                   </p:oleObj>
                 </mc:Choice>
@@ -10091,7 +10106,7 @@
           <a:graphicData uri="http://schemas.openxmlformats.org/presentationml/2006/ole">
             <mc:AlternateContent xmlns:mc="http://schemas.openxmlformats.org/markup-compatibility/2006">
               <mc:Choice xmlns:v="urn:schemas-microsoft-com:vml" Requires="v">
-                <p:oleObj spid="_x0000_s6225" name="Equation" r:id="rId4" imgW="203200" imgH="292100" progId="Equation.DSMT4">
+                <p:oleObj spid="_x0000_s6230" name="Equation" r:id="rId4" imgW="203200" imgH="292100" progId="Equation.DSMT4">
                   <p:embed/>
                 </p:oleObj>
               </mc:Choice>
@@ -10299,7 +10314,7 @@
           <a:graphicData uri="http://schemas.openxmlformats.org/presentationml/2006/ole">
             <mc:AlternateContent xmlns:mc="http://schemas.openxmlformats.org/markup-compatibility/2006">
               <mc:Choice xmlns:v="urn:schemas-microsoft-com:vml" Requires="v">
-                <p:oleObj spid="_x0000_s6226" name="Equation" r:id="rId6" imgW="203200" imgH="292100" progId="Equation.DSMT4">
+                <p:oleObj spid="_x0000_s6231" name="Equation" r:id="rId6" imgW="203200" imgH="292100" progId="Equation.DSMT4">
                   <p:embed/>
                 </p:oleObj>
               </mc:Choice>
@@ -10419,7 +10434,7 @@
           <a:graphicData uri="http://schemas.openxmlformats.org/presentationml/2006/ole">
             <mc:AlternateContent xmlns:mc="http://schemas.openxmlformats.org/markup-compatibility/2006">
               <mc:Choice xmlns:v="urn:schemas-microsoft-com:vml" Requires="v">
-                <p:oleObj spid="_x0000_s6227" name="Equation" r:id="rId8" imgW="1943100" imgH="558800" progId="Equation.DSMT4">
+                <p:oleObj spid="_x0000_s6232" name="Equation" r:id="rId8" imgW="1943100" imgH="558800" progId="Equation.DSMT4">
                   <p:embed/>
                 </p:oleObj>
               </mc:Choice>
@@ -10476,7 +10491,7 @@
           <a:graphicData uri="http://schemas.openxmlformats.org/presentationml/2006/ole">
             <mc:AlternateContent xmlns:mc="http://schemas.openxmlformats.org/markup-compatibility/2006">
               <mc:Choice xmlns:v="urn:schemas-microsoft-com:vml" Requires="v">
-                <p:oleObj spid="_x0000_s6228" name="Equation" r:id="rId10" imgW="660400" imgH="292100" progId="Equation.DSMT4">
+                <p:oleObj spid="_x0000_s6233" name="Equation" r:id="rId10" imgW="660400" imgH="292100" progId="Equation.DSMT4">
                   <p:embed/>
                 </p:oleObj>
               </mc:Choice>
@@ -11702,7 +11717,7 @@
             <a:graphicData uri="http://schemas.openxmlformats.org/presentationml/2006/ole">
               <mc:AlternateContent xmlns:mc="http://schemas.openxmlformats.org/markup-compatibility/2006">
                 <mc:Choice xmlns:v="urn:schemas-microsoft-com:vml" Requires="v">
-                  <p:oleObj spid="_x0000_s30748" name="Equation" r:id="rId4" imgW="203200" imgH="292100" progId="Equation.DSMT4">
+                  <p:oleObj spid="_x0000_s30751" name="Equation" r:id="rId4" imgW="203200" imgH="292100" progId="Equation.DSMT4">
                     <p:embed/>
                   </p:oleObj>
                 </mc:Choice>
@@ -11760,7 +11775,7 @@
           <a:graphicData uri="http://schemas.openxmlformats.org/presentationml/2006/ole">
             <mc:AlternateContent xmlns:mc="http://schemas.openxmlformats.org/markup-compatibility/2006">
               <mc:Choice xmlns:v="urn:schemas-microsoft-com:vml" Requires="v">
-                <p:oleObj spid="_x0000_s30749" name="Equation" r:id="rId6" imgW="368300" imgH="292100" progId="Equation.DSMT4">
+                <p:oleObj spid="_x0000_s30752" name="Equation" r:id="rId6" imgW="368300" imgH="292100" progId="Equation.DSMT4">
                   <p:embed/>
                 </p:oleObj>
               </mc:Choice>
@@ -11927,7 +11942,7 @@
           <a:graphicData uri="http://schemas.openxmlformats.org/presentationml/2006/ole">
             <mc:AlternateContent xmlns:mc="http://schemas.openxmlformats.org/markup-compatibility/2006">
               <mc:Choice xmlns:v="urn:schemas-microsoft-com:vml" Requires="v">
-                <p:oleObj spid="_x0000_s43012" name="Equation" r:id="rId4" imgW="114300" imgH="165100" progId="Equation.3">
+                <p:oleObj spid="_x0000_s43016" name="Equation" r:id="rId4" imgW="114300" imgH="165100" progId="Equation.3">
                   <p:embed/>
                 </p:oleObj>
               </mc:Choice>
@@ -11984,7 +11999,7 @@
           <a:graphicData uri="http://schemas.openxmlformats.org/presentationml/2006/ole">
             <mc:AlternateContent xmlns:mc="http://schemas.openxmlformats.org/markup-compatibility/2006">
               <mc:Choice xmlns:v="urn:schemas-microsoft-com:vml" Requires="v">
-                <p:oleObj spid="_x0000_s43013" name="Equation" r:id="rId6" imgW="762000" imgH="292100" progId="Equation.DSMT4">
+                <p:oleObj spid="_x0000_s43017" name="Equation" r:id="rId6" imgW="762000" imgH="292100" progId="Equation.DSMT4">
                   <p:embed/>
                 </p:oleObj>
               </mc:Choice>
@@ -12041,7 +12056,7 @@
           <a:graphicData uri="http://schemas.openxmlformats.org/presentationml/2006/ole">
             <mc:AlternateContent xmlns:mc="http://schemas.openxmlformats.org/markup-compatibility/2006">
               <mc:Choice xmlns:v="urn:schemas-microsoft-com:vml" Requires="v">
-                <p:oleObj spid="_x0000_s43014" name="Equation" r:id="rId8" imgW="635000" imgH="292100" progId="Equation.DSMT4">
+                <p:oleObj spid="_x0000_s43018" name="Equation" r:id="rId8" imgW="635000" imgH="292100" progId="Equation.DSMT4">
                   <p:embed/>
                 </p:oleObj>
               </mc:Choice>
@@ -12284,7 +12299,7 @@
           <a:graphicData uri="http://schemas.openxmlformats.org/presentationml/2006/ole">
             <mc:AlternateContent xmlns:mc="http://schemas.openxmlformats.org/markup-compatibility/2006">
               <mc:Choice xmlns:v="urn:schemas-microsoft-com:vml" Requires="v">
-                <p:oleObj spid="_x0000_s24610" name="Equation" r:id="rId4" imgW="114300" imgH="165100" progId="Equation.3">
+                <p:oleObj spid="_x0000_s24613" name="Equation" r:id="rId4" imgW="114300" imgH="165100" progId="Equation.3">
                   <p:embed/>
                 </p:oleObj>
               </mc:Choice>
@@ -12341,7 +12356,7 @@
           <a:graphicData uri="http://schemas.openxmlformats.org/presentationml/2006/ole">
             <mc:AlternateContent xmlns:mc="http://schemas.openxmlformats.org/markup-compatibility/2006">
               <mc:Choice xmlns:v="urn:schemas-microsoft-com:vml" Requires="v">
-                <p:oleObj spid="_x0000_s24611" name="Equation" r:id="rId6" imgW="990600" imgH="292100" progId="Equation.DSMT4">
+                <p:oleObj spid="_x0000_s24614" name="Equation" r:id="rId6" imgW="990600" imgH="292100" progId="Equation.DSMT4">
                   <p:embed/>
                 </p:oleObj>
               </mc:Choice>
@@ -12648,7 +12663,7 @@
           <a:graphicData uri="http://schemas.openxmlformats.org/presentationml/2006/ole">
             <mc:AlternateContent xmlns:mc="http://schemas.openxmlformats.org/markup-compatibility/2006">
               <mc:Choice xmlns:v="urn:schemas-microsoft-com:vml" Requires="v">
-                <p:oleObj spid="_x0000_s27676" name="Equation" r:id="rId4" imgW="114300" imgH="165100" progId="Equation.3">
+                <p:oleObj spid="_x0000_s27679" name="Equation" r:id="rId4" imgW="114300" imgH="165100" progId="Equation.3">
                   <p:embed/>
                 </p:oleObj>
               </mc:Choice>
@@ -12705,7 +12720,7 @@
           <a:graphicData uri="http://schemas.openxmlformats.org/presentationml/2006/ole">
             <mc:AlternateContent xmlns:mc="http://schemas.openxmlformats.org/markup-compatibility/2006">
               <mc:Choice xmlns:v="urn:schemas-microsoft-com:vml" Requires="v">
-                <p:oleObj spid="_x0000_s27677" name="Equation" r:id="rId6" imgW="1231900" imgH="558800" progId="Equation.DSMT4">
+                <p:oleObj spid="_x0000_s27680" name="Equation" r:id="rId6" imgW="1231900" imgH="558800" progId="Equation.DSMT4">
                   <p:embed/>
                 </p:oleObj>
               </mc:Choice>
@@ -12877,7 +12892,7 @@
           <a:graphicData uri="http://schemas.openxmlformats.org/presentationml/2006/ole">
             <mc:AlternateContent xmlns:mc="http://schemas.openxmlformats.org/markup-compatibility/2006">
               <mc:Choice xmlns:v="urn:schemas-microsoft-com:vml" Requires="v">
-                <p:oleObj spid="_x0000_s26653" name="Equation" r:id="rId4" imgW="114300" imgH="165100" progId="Equation.3">
+                <p:oleObj spid="_x0000_s26656" name="Equation" r:id="rId4" imgW="114300" imgH="165100" progId="Equation.3">
                   <p:embed/>
                 </p:oleObj>
               </mc:Choice>
@@ -12934,7 +12949,7 @@
           <a:graphicData uri="http://schemas.openxmlformats.org/presentationml/2006/ole">
             <mc:AlternateContent xmlns:mc="http://schemas.openxmlformats.org/markup-compatibility/2006">
               <mc:Choice xmlns:v="urn:schemas-microsoft-com:vml" Requires="v">
-                <p:oleObj spid="_x0000_s26654" name="Equation" r:id="rId6" imgW="1206500" imgH="558800" progId="Equation.3">
+                <p:oleObj spid="_x0000_s26657" name="Equation" r:id="rId6" imgW="1206500" imgH="558800" progId="Equation.3">
                   <p:embed/>
                 </p:oleObj>
               </mc:Choice>
@@ -13251,7 +13266,7 @@
           <a:graphicData uri="http://schemas.openxmlformats.org/presentationml/2006/ole">
             <mc:AlternateContent xmlns:mc="http://schemas.openxmlformats.org/markup-compatibility/2006">
               <mc:Choice xmlns:v="urn:schemas-microsoft-com:vml" Requires="v">
-                <p:oleObj spid="_x0000_s38925" name="Equation" r:id="rId4" imgW="114300" imgH="165100" progId="Equation.3">
+                <p:oleObj spid="_x0000_s38928" name="Equation" r:id="rId4" imgW="114300" imgH="165100" progId="Equation.3">
                   <p:embed/>
                 </p:oleObj>
               </mc:Choice>
@@ -13308,7 +13323,7 @@
           <a:graphicData uri="http://schemas.openxmlformats.org/presentationml/2006/ole">
             <mc:AlternateContent xmlns:mc="http://schemas.openxmlformats.org/markup-compatibility/2006">
               <mc:Choice xmlns:v="urn:schemas-microsoft-com:vml" Requires="v">
-                <p:oleObj spid="_x0000_s38926" name="Equation" r:id="rId6" imgW="825500" imgH="457200" progId="Equation.DSMT4">
+                <p:oleObj spid="_x0000_s38929" name="Equation" r:id="rId6" imgW="825500" imgH="457200" progId="Equation.DSMT4">
                   <p:embed/>
                 </p:oleObj>
               </mc:Choice>
@@ -13480,7 +13495,7 @@
           <a:graphicData uri="http://schemas.openxmlformats.org/presentationml/2006/ole">
             <mc:AlternateContent xmlns:mc="http://schemas.openxmlformats.org/markup-compatibility/2006">
               <mc:Choice xmlns:v="urn:schemas-microsoft-com:vml" Requires="v">
-                <p:oleObj spid="_x0000_s23589" name="Equation" r:id="rId4" imgW="114300" imgH="165100" progId="Equation.3">
+                <p:oleObj spid="_x0000_s23592" name="Equation" r:id="rId4" imgW="114300" imgH="165100" progId="Equation.3">
                   <p:embed/>
                 </p:oleObj>
               </mc:Choice>
@@ -13537,7 +13552,7 @@
           <a:graphicData uri="http://schemas.openxmlformats.org/presentationml/2006/ole">
             <mc:AlternateContent xmlns:mc="http://schemas.openxmlformats.org/markup-compatibility/2006">
               <mc:Choice xmlns:v="urn:schemas-microsoft-com:vml" Requires="v">
-                <p:oleObj spid="_x0000_s23590" name="Equation" r:id="rId6" imgW="863600" imgH="279400" progId="Equation.3">
+                <p:oleObj spid="_x0000_s23593" name="Equation" r:id="rId6" imgW="863600" imgH="279400" progId="Equation.3">
                   <p:embed/>
                 </p:oleObj>
               </mc:Choice>
@@ -13926,7 +13941,7 @@
           <a:graphicData uri="http://schemas.openxmlformats.org/presentationml/2006/ole">
             <mc:AlternateContent xmlns:mc="http://schemas.openxmlformats.org/markup-compatibility/2006">
               <mc:Choice xmlns:v="urn:schemas-microsoft-com:vml" Requires="v">
-                <p:oleObj spid="_x0000_s22581" name="Equation" r:id="rId4" imgW="114300" imgH="165100" progId="Equation.3">
+                <p:oleObj spid="_x0000_s22586" name="Equation" r:id="rId4" imgW="114300" imgH="165100" progId="Equation.3">
                   <p:embed/>
                 </p:oleObj>
               </mc:Choice>
@@ -13983,7 +13998,7 @@
           <a:graphicData uri="http://schemas.openxmlformats.org/presentationml/2006/ole">
             <mc:AlternateContent xmlns:mc="http://schemas.openxmlformats.org/markup-compatibility/2006">
               <mc:Choice xmlns:v="urn:schemas-microsoft-com:vml" Requires="v">
-                <p:oleObj spid="_x0000_s22582" name="Equation" r:id="rId6" imgW="762000" imgH="292100" progId="Equation.DSMT4">
+                <p:oleObj spid="_x0000_s22587" name="Equation" r:id="rId6" imgW="762000" imgH="292100" progId="Equation.DSMT4">
                   <p:embed/>
                 </p:oleObj>
               </mc:Choice>
@@ -14040,7 +14055,7 @@
           <a:graphicData uri="http://schemas.openxmlformats.org/presentationml/2006/ole">
             <mc:AlternateContent xmlns:mc="http://schemas.openxmlformats.org/markup-compatibility/2006">
               <mc:Choice xmlns:v="urn:schemas-microsoft-com:vml" Requires="v">
-                <p:oleObj spid="_x0000_s22583" name="Equation" r:id="rId8" imgW="1790700" imgH="584200" progId="Equation.DSMT4">
+                <p:oleObj spid="_x0000_s22588" name="Equation" r:id="rId8" imgW="1790700" imgH="584200" progId="Equation.DSMT4">
                   <p:embed/>
                 </p:oleObj>
               </mc:Choice>
@@ -14097,7 +14112,7 @@
           <a:graphicData uri="http://schemas.openxmlformats.org/presentationml/2006/ole">
             <mc:AlternateContent xmlns:mc="http://schemas.openxmlformats.org/markup-compatibility/2006">
               <mc:Choice xmlns:v="urn:schemas-microsoft-com:vml" Requires="v">
-                <p:oleObj spid="_x0000_s22584" name="Equation" r:id="rId10" imgW="1485900" imgH="330200" progId="Equation.DSMT4">
+                <p:oleObj spid="_x0000_s22589" name="Equation" r:id="rId10" imgW="1485900" imgH="330200" progId="Equation.DSMT4">
                   <p:embed/>
                 </p:oleObj>
               </mc:Choice>
@@ -14258,7 +14273,7 @@
           <a:graphicData uri="http://schemas.openxmlformats.org/presentationml/2006/ole">
             <mc:AlternateContent xmlns:mc="http://schemas.openxmlformats.org/markup-compatibility/2006">
               <mc:Choice xmlns:v="urn:schemas-microsoft-com:vml" Requires="v">
-                <p:oleObj spid="_x0000_s1065" name="Equation" r:id="rId4" imgW="126720" imgH="190440" progId="Equation.DSMT4">
+                <p:oleObj spid="_x0000_s1068" name="Equation" r:id="rId4" imgW="126720" imgH="190440" progId="Equation.DSMT4">
                   <p:embed/>
                 </p:oleObj>
               </mc:Choice>
@@ -14359,7 +14374,7 @@
           <a:graphicData uri="http://schemas.openxmlformats.org/presentationml/2006/ole">
             <mc:AlternateContent xmlns:mc="http://schemas.openxmlformats.org/markup-compatibility/2006">
               <mc:Choice xmlns:v="urn:schemas-microsoft-com:vml" Requires="v">
-                <p:oleObj spid="_x0000_s1066" name="Equation" r:id="rId6" imgW="2044700" imgH="647700" progId="Equation.3">
+                <p:oleObj spid="_x0000_s1069" name="Equation" r:id="rId6" imgW="2044700" imgH="647700" progId="Equation.3">
                   <p:embed/>
                 </p:oleObj>
               </mc:Choice>
@@ -14618,7 +14633,7 @@
           <a:graphicData uri="http://schemas.openxmlformats.org/presentationml/2006/ole">
             <mc:AlternateContent xmlns:mc="http://schemas.openxmlformats.org/markup-compatibility/2006">
               <mc:Choice xmlns:v="urn:schemas-microsoft-com:vml" Requires="v">
-                <p:oleObj spid="_x0000_s2089" name="Equation" r:id="rId4" imgW="126720" imgH="190440" progId="Equation.DSMT4">
+                <p:oleObj spid="_x0000_s2092" name="Equation" r:id="rId4" imgW="126720" imgH="190440" progId="Equation.DSMT4">
                   <p:embed/>
                 </p:oleObj>
               </mc:Choice>
@@ -14688,7 +14703,7 @@
           <a:graphicData uri="http://schemas.openxmlformats.org/presentationml/2006/ole">
             <mc:AlternateContent xmlns:mc="http://schemas.openxmlformats.org/markup-compatibility/2006">
               <mc:Choice xmlns:v="urn:schemas-microsoft-com:vml" Requires="v">
-                <p:oleObj spid="_x0000_s2090" name="Equation" r:id="rId6" imgW="2044700" imgH="812800" progId="Equation.3">
+                <p:oleObj spid="_x0000_s2093" name="Equation" r:id="rId6" imgW="2044700" imgH="812800" progId="Equation.3">
                   <p:embed/>
                 </p:oleObj>
               </mc:Choice>
@@ -14844,7 +14859,7 @@
           <a:graphicData uri="http://schemas.openxmlformats.org/presentationml/2006/ole">
             <mc:AlternateContent xmlns:mc="http://schemas.openxmlformats.org/markup-compatibility/2006">
               <mc:Choice xmlns:v="urn:schemas-microsoft-com:vml" Requires="v">
-                <p:oleObj spid="_x0000_s7208" name="Equation" r:id="rId4" imgW="1447800" imgH="292100" progId="Equation.DSMT4">
+                <p:oleObj spid="_x0000_s7211" name="Equation" r:id="rId4" imgW="1447800" imgH="292100" progId="Equation.DSMT4">
                   <p:embed/>
                 </p:oleObj>
               </mc:Choice>
@@ -14901,7 +14916,7 @@
           <a:graphicData uri="http://schemas.openxmlformats.org/presentationml/2006/ole">
             <mc:AlternateContent xmlns:mc="http://schemas.openxmlformats.org/markup-compatibility/2006">
               <mc:Choice xmlns:v="urn:schemas-microsoft-com:vml" Requires="v">
-                <p:oleObj spid="_x0000_s7209" name="Equation" r:id="rId6" imgW="2451100" imgH="558800" progId="Equation.DSMT4">
+                <p:oleObj spid="_x0000_s7212" name="Equation" r:id="rId6" imgW="2451100" imgH="558800" progId="Equation.DSMT4">
                   <p:embed/>
                 </p:oleObj>
               </mc:Choice>
@@ -15001,7 +15016,7 @@
           <a:graphicData uri="http://schemas.openxmlformats.org/presentationml/2006/ole">
             <mc:AlternateContent xmlns:mc="http://schemas.openxmlformats.org/markup-compatibility/2006">
               <mc:Choice xmlns:v="urn:schemas-microsoft-com:vml" Requires="v">
-                <p:oleObj spid="_x0000_s3113" name="Equation" r:id="rId4" imgW="2031840" imgH="736560" progId="Equation.DSMT4">
+                <p:oleObj spid="_x0000_s3116" name="Equation" r:id="rId4" imgW="2031840" imgH="736560" progId="Equation.DSMT4">
                   <p:embed/>
                 </p:oleObj>
               </mc:Choice>
@@ -15125,7 +15140,7 @@
           <a:graphicData uri="http://schemas.openxmlformats.org/presentationml/2006/ole">
             <mc:AlternateContent xmlns:mc="http://schemas.openxmlformats.org/markup-compatibility/2006">
               <mc:Choice xmlns:v="urn:schemas-microsoft-com:vml" Requires="v">
-                <p:oleObj spid="_x0000_s3114" name="Equation" r:id="rId6" imgW="126720" imgH="190440" progId="Equation.3">
+                <p:oleObj spid="_x0000_s3117" name="Equation" r:id="rId6" imgW="126720" imgH="190440" progId="Equation.3">
                   <p:embed/>
                 </p:oleObj>
               </mc:Choice>
@@ -15552,7 +15567,7 @@
           <a:graphicData uri="http://schemas.openxmlformats.org/presentationml/2006/ole">
             <mc:AlternateContent xmlns:mc="http://schemas.openxmlformats.org/markup-compatibility/2006">
               <mc:Choice xmlns:v="urn:schemas-microsoft-com:vml" Requires="v">
-                <p:oleObj spid="_x0000_s4153" name="Equation" r:id="rId4" imgW="126720" imgH="190440" progId="Equation.DSMT4">
+                <p:oleObj spid="_x0000_s4157" name="Equation" r:id="rId4" imgW="126720" imgH="190440" progId="Equation.DSMT4">
                   <p:embed/>
                 </p:oleObj>
               </mc:Choice>
@@ -15622,7 +15637,7 @@
           <a:graphicData uri="http://schemas.openxmlformats.org/presentationml/2006/ole">
             <mc:AlternateContent xmlns:mc="http://schemas.openxmlformats.org/markup-compatibility/2006">
               <mc:Choice xmlns:v="urn:schemas-microsoft-com:vml" Requires="v">
-                <p:oleObj spid="_x0000_s4154" name="Equation" r:id="rId6" imgW="393480" imgH="342720" progId="Equation.DSMT4">
+                <p:oleObj spid="_x0000_s4158" name="Equation" r:id="rId6" imgW="393480" imgH="342720" progId="Equation.DSMT4">
                   <p:embed/>
                 </p:oleObj>
               </mc:Choice>
@@ -15692,7 +15707,7 @@
           <a:graphicData uri="http://schemas.openxmlformats.org/presentationml/2006/ole">
             <mc:AlternateContent xmlns:mc="http://schemas.openxmlformats.org/markup-compatibility/2006">
               <mc:Choice xmlns:v="urn:schemas-microsoft-com:vml" Requires="v">
-                <p:oleObj spid="_x0000_s4155" name="Equation" r:id="rId8" imgW="1917360" imgH="711000" progId="Equation.3">
+                <p:oleObj spid="_x0000_s4159" name="Equation" r:id="rId8" imgW="1917360" imgH="711000" progId="Equation.3">
                   <p:embed/>
                 </p:oleObj>
               </mc:Choice>
@@ -16299,7 +16314,7 @@
           <a:graphicData uri="http://schemas.openxmlformats.org/presentationml/2006/ole">
             <mc:AlternateContent xmlns:mc="http://schemas.openxmlformats.org/markup-compatibility/2006">
               <mc:Choice xmlns:v="urn:schemas-microsoft-com:vml" Requires="v">
-                <p:oleObj spid="_x0000_s9261" name="Equation" r:id="rId4" imgW="990600" imgH="292100" progId="Equation.DSMT4">
+                <p:oleObj spid="_x0000_s9265" name="Equation" r:id="rId4" imgW="990600" imgH="292100" progId="Equation.DSMT4">
                   <p:embed/>
                 </p:oleObj>
               </mc:Choice>
@@ -16356,7 +16371,7 @@
           <a:graphicData uri="http://schemas.openxmlformats.org/presentationml/2006/ole">
             <mc:AlternateContent xmlns:mc="http://schemas.openxmlformats.org/markup-compatibility/2006">
               <mc:Choice xmlns:v="urn:schemas-microsoft-com:vml" Requires="v">
-                <p:oleObj spid="_x0000_s9262" name="Equation" r:id="rId6" imgW="1130300" imgH="292100" progId="Equation.DSMT4">
+                <p:oleObj spid="_x0000_s9266" name="Equation" r:id="rId6" imgW="1130300" imgH="292100" progId="Equation.DSMT4">
                   <p:embed/>
                 </p:oleObj>
               </mc:Choice>
@@ -16413,7 +16428,7 @@
           <a:graphicData uri="http://schemas.openxmlformats.org/presentationml/2006/ole">
             <mc:AlternateContent xmlns:mc="http://schemas.openxmlformats.org/markup-compatibility/2006">
               <mc:Choice xmlns:v="urn:schemas-microsoft-com:vml" Requires="v">
-                <p:oleObj spid="_x0000_s9263" name="Equation" r:id="rId8" imgW="1130300" imgH="292100" progId="Equation.DSMT4">
+                <p:oleObj spid="_x0000_s9267" name="Equation" r:id="rId8" imgW="1130300" imgH="292100" progId="Equation.DSMT4">
                   <p:embed/>
                 </p:oleObj>
               </mc:Choice>
@@ -16765,7 +16780,7 @@
           <a:graphicData uri="http://schemas.openxmlformats.org/presentationml/2006/ole">
             <mc:AlternateContent xmlns:mc="http://schemas.openxmlformats.org/markup-compatibility/2006">
               <mc:Choice xmlns:v="urn:schemas-microsoft-com:vml" Requires="v">
-                <p:oleObj spid="_x0000_s12318" name="Equation" r:id="rId4" imgW="1701800" imgH="558800" progId="Equation.DSMT4">
+                <p:oleObj spid="_x0000_s12321" name="Equation" r:id="rId4" imgW="1701800" imgH="558800" progId="Equation.DSMT4">
                   <p:embed/>
                 </p:oleObj>
               </mc:Choice>
@@ -16822,7 +16837,7 @@
           <a:graphicData uri="http://schemas.openxmlformats.org/presentationml/2006/ole">
             <mc:AlternateContent xmlns:mc="http://schemas.openxmlformats.org/markup-compatibility/2006">
               <mc:Choice xmlns:v="urn:schemas-microsoft-com:vml" Requires="v">
-                <p:oleObj spid="_x0000_s12319" name="Equation" r:id="rId6" imgW="889000" imgH="292100" progId="Equation.DSMT4">
+                <p:oleObj spid="_x0000_s12322" name="Equation" r:id="rId6" imgW="889000" imgH="292100" progId="Equation.DSMT4">
                   <p:embed/>
                 </p:oleObj>
               </mc:Choice>
@@ -17060,7 +17075,7 @@
           <a:graphicData uri="http://schemas.openxmlformats.org/presentationml/2006/ole">
             <mc:AlternateContent xmlns:mc="http://schemas.openxmlformats.org/markup-compatibility/2006">
               <mc:Choice xmlns:v="urn:schemas-microsoft-com:vml" Requires="v">
-                <p:oleObj spid="_x0000_s10280" name="Equation" r:id="rId4" imgW="1473200" imgH="482600" progId="Equation.DSMT4">
+                <p:oleObj spid="_x0000_s10283" name="Equation" r:id="rId4" imgW="1473200" imgH="482600" progId="Equation.DSMT4">
                   <p:embed/>
                 </p:oleObj>
               </mc:Choice>
@@ -17155,7 +17170,7 @@
           <a:graphicData uri="http://schemas.openxmlformats.org/presentationml/2006/ole">
             <mc:AlternateContent xmlns:mc="http://schemas.openxmlformats.org/markup-compatibility/2006">
               <mc:Choice xmlns:v="urn:schemas-microsoft-com:vml" Requires="v">
-                <p:oleObj spid="_x0000_s10281" name="Equation" r:id="rId6" imgW="1562100" imgH="304800" progId="Equation.3">
+                <p:oleObj spid="_x0000_s10284" name="Equation" r:id="rId6" imgW="1562100" imgH="304800" progId="Equation.3">
                   <p:embed/>
                 </p:oleObj>
               </mc:Choice>
@@ -17567,7 +17582,7 @@
           <a:graphicData uri="http://schemas.openxmlformats.org/presentationml/2006/ole">
             <mc:AlternateContent xmlns:mc="http://schemas.openxmlformats.org/markup-compatibility/2006">
               <mc:Choice xmlns:v="urn:schemas-microsoft-com:vml" Requires="v">
-                <p:oleObj spid="_x0000_s8227" name="Equation" r:id="rId4" imgW="203200" imgH="292100" progId="Equation.DSMT4">
+                <p:oleObj spid="_x0000_s8230" name="Equation" r:id="rId4" imgW="203200" imgH="292100" progId="Equation.DSMT4">
                   <p:embed/>
                 </p:oleObj>
               </mc:Choice>
@@ -17624,7 +17639,7 @@
           <a:graphicData uri="http://schemas.openxmlformats.org/presentationml/2006/ole">
             <mc:AlternateContent xmlns:mc="http://schemas.openxmlformats.org/markup-compatibility/2006">
               <mc:Choice xmlns:v="urn:schemas-microsoft-com:vml" Requires="v">
-                <p:oleObj spid="_x0000_s8228" name="Equation" r:id="rId6" imgW="2616200" imgH="914400" progId="Equation.DSMT4">
+                <p:oleObj spid="_x0000_s8231" name="Equation" r:id="rId6" imgW="2616200" imgH="914400" progId="Equation.DSMT4">
                   <p:embed/>
                 </p:oleObj>
               </mc:Choice>
@@ -17806,7 +17821,7 @@
           <a:graphicData uri="http://schemas.openxmlformats.org/presentationml/2006/ole">
             <mc:AlternateContent xmlns:mc="http://schemas.openxmlformats.org/markup-compatibility/2006">
               <mc:Choice xmlns:v="urn:schemas-microsoft-com:vml" Requires="v">
-                <p:oleObj spid="_x0000_s11302" name="Equation" r:id="rId4" imgW="2336800" imgH="914400" progId="Equation.DSMT4">
+                <p:oleObj spid="_x0000_s11305" name="Equation" r:id="rId4" imgW="2336800" imgH="914400" progId="Equation.DSMT4">
                   <p:embed/>
                 </p:oleObj>
               </mc:Choice>
@@ -18093,7 +18108,7 @@
           <a:graphicData uri="http://schemas.openxmlformats.org/presentationml/2006/ole">
             <mc:AlternateContent xmlns:mc="http://schemas.openxmlformats.org/markup-compatibility/2006">
               <mc:Choice xmlns:v="urn:schemas-microsoft-com:vml" Requires="v">
-                <p:oleObj spid="_x0000_s11303" name="Equation" r:id="rId6" imgW="203200" imgH="292100" progId="Equation.DSMT4">
+                <p:oleObj spid="_x0000_s11306" name="Equation" r:id="rId6" imgW="203200" imgH="292100" progId="Equation.DSMT4">
                   <p:embed/>
                 </p:oleObj>
               </mc:Choice>
@@ -18508,7 +18523,7 @@
           <a:graphicData uri="http://schemas.openxmlformats.org/presentationml/2006/ole">
             <mc:AlternateContent xmlns:mc="http://schemas.openxmlformats.org/markup-compatibility/2006">
               <mc:Choice xmlns:v="urn:schemas-microsoft-com:vml" Requires="v">
-                <p:oleObj spid="_x0000_s13360" name="Equation" r:id="rId4" imgW="203200" imgH="292100" progId="Equation.DSMT4">
+                <p:oleObj spid="_x0000_s13364" name="Equation" r:id="rId4" imgW="203200" imgH="292100" progId="Equation.DSMT4">
                   <p:embed/>
                 </p:oleObj>
               </mc:Choice>
@@ -18565,7 +18580,7 @@
           <a:graphicData uri="http://schemas.openxmlformats.org/presentationml/2006/ole">
             <mc:AlternateContent xmlns:mc="http://schemas.openxmlformats.org/markup-compatibility/2006">
               <mc:Choice xmlns:v="urn:schemas-microsoft-com:vml" Requires="v">
-                <p:oleObj spid="_x0000_s13361" name="Equation" r:id="rId6" imgW="139700" imgH="215900" progId="Equation.DSMT4">
+                <p:oleObj spid="_x0000_s13365" name="Equation" r:id="rId6" imgW="139700" imgH="215900" progId="Equation.DSMT4">
                   <p:embed/>
                 </p:oleObj>
               </mc:Choice>
@@ -18622,7 +18637,7 @@
           <a:graphicData uri="http://schemas.openxmlformats.org/presentationml/2006/ole">
             <mc:AlternateContent xmlns:mc="http://schemas.openxmlformats.org/markup-compatibility/2006">
               <mc:Choice xmlns:v="urn:schemas-microsoft-com:vml" Requires="v">
-                <p:oleObj spid="_x0000_s13362" name="Equation" r:id="rId8" imgW="1257300" imgH="685800" progId="Equation.DSMT4">
+                <p:oleObj spid="_x0000_s13366" name="Equation" r:id="rId8" imgW="1257300" imgH="685800" progId="Equation.DSMT4">
                   <p:embed/>
                 </p:oleObj>
               </mc:Choice>

</xml_diff>